<commit_message>
now we have 4w embedding vectors
</commit_message>
<xml_diff>
--- a/presentation_v1.0.pptx
+++ b/presentation_v1.0.pptx
@@ -210,7 +210,7 @@
           <a:p>
             <a:fld id="{1194AB80-D395-4F6C-B129-7800A2D57260}" type="datetimeFigureOut">
               <a:rPr lang="en-US" smtClean="0"/>
-              <a:t>12/2/2020</a:t>
+              <a:t>12/4/2020</a:t>
             </a:fld>
             <a:endParaRPr lang="en-US"/>
           </a:p>
@@ -1240,7 +1240,7 @@
           <a:p>
             <a:fld id="{02AC24A9-CCB6-4F8D-B8DB-C2F3692CFA5A}" type="datetimeFigureOut">
               <a:rPr lang="en-US" smtClean="0"/>
-              <a:t>12/2/2020</a:t>
+              <a:t>12/4/2020</a:t>
             </a:fld>
             <a:endParaRPr lang="en-US" dirty="0"/>
           </a:p>
@@ -1610,7 +1610,7 @@
           <a:p>
             <a:fld id="{02AC24A9-CCB6-4F8D-B8DB-C2F3692CFA5A}" type="datetimeFigureOut">
               <a:rPr lang="en-US" smtClean="0"/>
-              <a:t>12/2/2020</a:t>
+              <a:t>12/4/2020</a:t>
             </a:fld>
             <a:endParaRPr lang="en-US"/>
           </a:p>
@@ -1819,7 +1819,7 @@
           <a:p>
             <a:fld id="{02AC24A9-CCB6-4F8D-B8DB-C2F3692CFA5A}" type="datetimeFigureOut">
               <a:rPr lang="en-US" smtClean="0"/>
-              <a:t>12/2/2020</a:t>
+              <a:t>12/4/2020</a:t>
             </a:fld>
             <a:endParaRPr lang="en-US"/>
           </a:p>
@@ -2289,7 +2289,7 @@
           <a:p>
             <a:fld id="{02AC24A9-CCB6-4F8D-B8DB-C2F3692CFA5A}" type="datetimeFigureOut">
               <a:rPr lang="en-US" smtClean="0"/>
-              <a:t>12/2/2020</a:t>
+              <a:t>12/4/2020</a:t>
             </a:fld>
             <a:endParaRPr lang="en-US" dirty="0"/>
           </a:p>
@@ -2746,7 +2746,7 @@
           <a:p>
             <a:fld id="{02AC24A9-CCB6-4F8D-B8DB-C2F3692CFA5A}" type="datetimeFigureOut">
               <a:rPr lang="en-US" smtClean="0"/>
-              <a:t>12/2/2020</a:t>
+              <a:t>12/4/2020</a:t>
             </a:fld>
             <a:endParaRPr lang="en-US"/>
           </a:p>
@@ -3278,7 +3278,7 @@
           <a:p>
             <a:fld id="{02AC24A9-CCB6-4F8D-B8DB-C2F3692CFA5A}" type="datetimeFigureOut">
               <a:rPr lang="en-US" smtClean="0"/>
-              <a:t>12/2/2020</a:t>
+              <a:t>12/4/2020</a:t>
             </a:fld>
             <a:endParaRPr lang="en-US"/>
           </a:p>
@@ -3977,7 +3977,7 @@
           <a:p>
             <a:fld id="{02AC24A9-CCB6-4F8D-B8DB-C2F3692CFA5A}" type="datetimeFigureOut">
               <a:rPr lang="en-US" smtClean="0"/>
-              <a:t>12/2/2020</a:t>
+              <a:t>12/4/2020</a:t>
             </a:fld>
             <a:endParaRPr lang="en-US"/>
           </a:p>
@@ -4306,7 +4306,7 @@
           <a:p>
             <a:fld id="{02AC24A9-CCB6-4F8D-B8DB-C2F3692CFA5A}" type="datetimeFigureOut">
               <a:rPr lang="en-US" smtClean="0"/>
-              <a:t>12/2/2020</a:t>
+              <a:t>12/4/2020</a:t>
             </a:fld>
             <a:endParaRPr lang="en-US"/>
           </a:p>
@@ -4419,7 +4419,7 @@
           <a:p>
             <a:fld id="{02AC24A9-CCB6-4F8D-B8DB-C2F3692CFA5A}" type="datetimeFigureOut">
               <a:rPr lang="en-US" smtClean="0"/>
-              <a:t>12/2/2020</a:t>
+              <a:t>12/4/2020</a:t>
             </a:fld>
             <a:endParaRPr lang="en-US"/>
           </a:p>
@@ -4914,7 +4914,7 @@
           <a:p>
             <a:fld id="{02AC24A9-CCB6-4F8D-B8DB-C2F3692CFA5A}" type="datetimeFigureOut">
               <a:rPr lang="en-US" smtClean="0"/>
-              <a:t>12/2/2020</a:t>
+              <a:t>12/4/2020</a:t>
             </a:fld>
             <a:endParaRPr lang="en-US" dirty="0"/>
           </a:p>
@@ -5391,7 +5391,7 @@
           <a:p>
             <a:fld id="{02AC24A9-CCB6-4F8D-B8DB-C2F3692CFA5A}" type="datetimeFigureOut">
               <a:rPr lang="en-US" smtClean="0"/>
-              <a:t>12/2/2020</a:t>
+              <a:t>12/4/2020</a:t>
             </a:fld>
             <a:endParaRPr lang="en-US"/>
           </a:p>
@@ -5634,7 +5634,7 @@
           <a:p>
             <a:fld id="{02AC24A9-CCB6-4F8D-B8DB-C2F3692CFA5A}" type="datetimeFigureOut">
               <a:rPr lang="en-US" smtClean="0"/>
-              <a:t>12/2/2020</a:t>
+              <a:t>12/4/2020</a:t>
             </a:fld>
             <a:endParaRPr lang="en-US"/>
           </a:p>

</xml_diff>